<commit_message>
Add new and Update
- Add xds 31, xds 34 and 我心屬於你
- Update xds 33, 36, 56, 68
</commit_message>
<xml_diff>
--- a/宣道詩/(宣道詩33)只有寶血.pptx
+++ b/宣道詩/(宣道詩33)只有寶血.pptx
@@ -6,16 +6,19 @@
   </p:sldMasterIdLst>
   <p:sldIdLst>
     <p:sldId id="256" r:id="rId2"/>
-    <p:sldId id="257" r:id="rId3"/>
-    <p:sldId id="258" r:id="rId4"/>
-    <p:sldId id="259" r:id="rId5"/>
-    <p:sldId id="260" r:id="rId6"/>
-    <p:sldId id="261" r:id="rId7"/>
-    <p:sldId id="262" r:id="rId8"/>
-    <p:sldId id="263" r:id="rId9"/>
-    <p:sldId id="264" r:id="rId10"/>
+    <p:sldId id="265" r:id="rId3"/>
+    <p:sldId id="257" r:id="rId4"/>
+    <p:sldId id="258" r:id="rId5"/>
+    <p:sldId id="259" r:id="rId6"/>
+    <p:sldId id="266" r:id="rId7"/>
+    <p:sldId id="260" r:id="rId8"/>
+    <p:sldId id="261" r:id="rId9"/>
+    <p:sldId id="262" r:id="rId10"/>
+    <p:sldId id="267" r:id="rId11"/>
+    <p:sldId id="263" r:id="rId12"/>
+    <p:sldId id="264" r:id="rId13"/>
   </p:sldIdLst>
-  <p:sldSz cx="9144000" cy="6858000" type="screen4x3"/>
+  <p:sldSz cx="12192000" cy="6858000"/>
   <p:notesSz cx="6858000" cy="9144000"/>
   <p:defaultTextStyle>
     <a:defPPr>
@@ -112,6 +115,22 @@
       </a:defRPr>
     </a:lvl9pPr>
   </p:defaultTextStyle>
+  <p:extLst>
+    <p:ext uri="{EFAFB233-063F-42B5-8137-9DF3F51BA10A}">
+      <p15:sldGuideLst xmlns:p15="http://schemas.microsoft.com/office/powerpoint/2012/main">
+        <p15:guide id="1" orient="horz" pos="2160" userDrawn="1">
+          <p15:clr>
+            <a:srgbClr val="A4A3A4"/>
+          </p15:clr>
+        </p15:guide>
+        <p15:guide id="2" pos="3840" userDrawn="1">
+          <p15:clr>
+            <a:srgbClr val="A4A3A4"/>
+          </p15:clr>
+        </p15:guide>
+      </p15:sldGuideLst>
+    </p:ext>
+  </p:extLst>
 </p:presentation>
 </file>
 
@@ -144,8 +163,8 @@
         </p:nvSpPr>
         <p:spPr>
           <a:xfrm>
-            <a:off x="685800" y="2130425"/>
-            <a:ext cx="7772400" cy="1470025"/>
+            <a:off x="914400" y="2130426"/>
+            <a:ext cx="10363200" cy="1470025"/>
           </a:xfrm>
         </p:spPr>
         <p:txBody>
@@ -172,8 +191,8 @@
         </p:nvSpPr>
         <p:spPr>
           <a:xfrm>
-            <a:off x="1371600" y="3886200"/>
-            <a:ext cx="6400800" cy="1752600"/>
+            <a:off x="1828800" y="3886200"/>
+            <a:ext cx="8534400" cy="1752600"/>
           </a:xfrm>
         </p:spPr>
         <p:txBody>
@@ -297,7 +316,7 @@
             <a:fld id="{212F838A-6F4B-4BB1-BACD-B06005FD32E3}" type="datetimeFigureOut">
               <a:rPr lang="zh-TW" altLang="en-US" smtClean="0"/>
               <a:pPr/>
-              <a:t>2018/8/4</a:t>
+              <a:t>2020/9/4</a:t>
             </a:fld>
             <a:endParaRPr lang="zh-TW" altLang="en-US"/>
           </a:p>
@@ -464,7 +483,7 @@
             <a:fld id="{212F838A-6F4B-4BB1-BACD-B06005FD32E3}" type="datetimeFigureOut">
               <a:rPr lang="zh-TW" altLang="en-US" smtClean="0"/>
               <a:pPr/>
-              <a:t>2018/8/4</a:t>
+              <a:t>2020/9/4</a:t>
             </a:fld>
             <a:endParaRPr lang="zh-TW" altLang="en-US"/>
           </a:p>
@@ -550,8 +569,8 @@
         </p:nvSpPr>
         <p:spPr>
           <a:xfrm>
-            <a:off x="6629400" y="274638"/>
-            <a:ext cx="2057400" cy="5851525"/>
+            <a:off x="8839200" y="274639"/>
+            <a:ext cx="2743200" cy="5851525"/>
           </a:xfrm>
         </p:spPr>
         <p:txBody>
@@ -578,8 +597,8 @@
         </p:nvSpPr>
         <p:spPr>
           <a:xfrm>
-            <a:off x="457200" y="274638"/>
-            <a:ext cx="6019800" cy="5851525"/>
+            <a:off x="609600" y="274639"/>
+            <a:ext cx="8026400" cy="5851525"/>
           </a:xfrm>
         </p:spPr>
         <p:txBody>
@@ -641,7 +660,7 @@
             <a:fld id="{212F838A-6F4B-4BB1-BACD-B06005FD32E3}" type="datetimeFigureOut">
               <a:rPr lang="zh-TW" altLang="en-US" smtClean="0"/>
               <a:pPr/>
-              <a:t>2018/8/4</a:t>
+              <a:t>2020/9/4</a:t>
             </a:fld>
             <a:endParaRPr lang="zh-TW" altLang="en-US"/>
           </a:p>
@@ -808,7 +827,7 @@
             <a:fld id="{212F838A-6F4B-4BB1-BACD-B06005FD32E3}" type="datetimeFigureOut">
               <a:rPr lang="zh-TW" altLang="en-US" smtClean="0"/>
               <a:pPr/>
-              <a:t>2018/8/4</a:t>
+              <a:t>2020/9/4</a:t>
             </a:fld>
             <a:endParaRPr lang="zh-TW" altLang="en-US"/>
           </a:p>
@@ -894,8 +913,8 @@
         </p:nvSpPr>
         <p:spPr>
           <a:xfrm>
-            <a:off x="722313" y="4406900"/>
-            <a:ext cx="7772400" cy="1362075"/>
+            <a:off x="963084" y="4406901"/>
+            <a:ext cx="10363200" cy="1362075"/>
           </a:xfrm>
         </p:spPr>
         <p:txBody>
@@ -926,8 +945,8 @@
         </p:nvSpPr>
         <p:spPr>
           <a:xfrm>
-            <a:off x="722313" y="2906713"/>
-            <a:ext cx="7772400" cy="1500187"/>
+            <a:off x="963084" y="2906713"/>
+            <a:ext cx="10363200" cy="1500187"/>
           </a:xfrm>
         </p:spPr>
         <p:txBody>
@@ -1051,7 +1070,7 @@
             <a:fld id="{212F838A-6F4B-4BB1-BACD-B06005FD32E3}" type="datetimeFigureOut">
               <a:rPr lang="zh-TW" altLang="en-US" smtClean="0"/>
               <a:pPr/>
-              <a:t>2018/8/4</a:t>
+              <a:t>2020/9/4</a:t>
             </a:fld>
             <a:endParaRPr lang="zh-TW" altLang="en-US"/>
           </a:p>
@@ -1160,8 +1179,8 @@
         </p:nvSpPr>
         <p:spPr>
           <a:xfrm>
-            <a:off x="457200" y="1600200"/>
-            <a:ext cx="4038600" cy="4525963"/>
+            <a:off x="609600" y="1600201"/>
+            <a:ext cx="5384800" cy="4525963"/>
           </a:xfrm>
         </p:spPr>
         <p:txBody>
@@ -1245,8 +1264,8 @@
         </p:nvSpPr>
         <p:spPr>
           <a:xfrm>
-            <a:off x="4648200" y="1600200"/>
-            <a:ext cx="4038600" cy="4525963"/>
+            <a:off x="6197600" y="1600201"/>
+            <a:ext cx="5384800" cy="4525963"/>
           </a:xfrm>
         </p:spPr>
         <p:txBody>
@@ -1336,7 +1355,7 @@
             <a:fld id="{212F838A-6F4B-4BB1-BACD-B06005FD32E3}" type="datetimeFigureOut">
               <a:rPr lang="zh-TW" altLang="en-US" smtClean="0"/>
               <a:pPr/>
-              <a:t>2018/8/4</a:t>
+              <a:t>2020/9/4</a:t>
             </a:fld>
             <a:endParaRPr lang="zh-TW" altLang="en-US"/>
           </a:p>
@@ -1449,8 +1468,8 @@
         </p:nvSpPr>
         <p:spPr>
           <a:xfrm>
-            <a:off x="457200" y="1535113"/>
-            <a:ext cx="4040188" cy="639762"/>
+            <a:off x="609600" y="1535113"/>
+            <a:ext cx="5386917" cy="639762"/>
           </a:xfrm>
         </p:spPr>
         <p:txBody>
@@ -1514,8 +1533,8 @@
         </p:nvSpPr>
         <p:spPr>
           <a:xfrm>
-            <a:off x="457200" y="2174875"/>
-            <a:ext cx="4040188" cy="3951288"/>
+            <a:off x="609600" y="2174875"/>
+            <a:ext cx="5386917" cy="3951288"/>
           </a:xfrm>
         </p:spPr>
         <p:txBody>
@@ -1599,8 +1618,8 @@
         </p:nvSpPr>
         <p:spPr>
           <a:xfrm>
-            <a:off x="4645025" y="1535113"/>
-            <a:ext cx="4041775" cy="639762"/>
+            <a:off x="6193368" y="1535113"/>
+            <a:ext cx="5389033" cy="639762"/>
           </a:xfrm>
         </p:spPr>
         <p:txBody>
@@ -1664,8 +1683,8 @@
         </p:nvSpPr>
         <p:spPr>
           <a:xfrm>
-            <a:off x="4645025" y="2174875"/>
-            <a:ext cx="4041775" cy="3951288"/>
+            <a:off x="6193368" y="2174875"/>
+            <a:ext cx="5389033" cy="3951288"/>
           </a:xfrm>
         </p:spPr>
         <p:txBody>
@@ -1755,7 +1774,7 @@
             <a:fld id="{212F838A-6F4B-4BB1-BACD-B06005FD32E3}" type="datetimeFigureOut">
               <a:rPr lang="zh-TW" altLang="en-US" smtClean="0"/>
               <a:pPr/>
-              <a:t>2018/8/4</a:t>
+              <a:t>2020/9/4</a:t>
             </a:fld>
             <a:endParaRPr lang="zh-TW" altLang="en-US"/>
           </a:p>
@@ -1870,7 +1889,7 @@
             <a:fld id="{212F838A-6F4B-4BB1-BACD-B06005FD32E3}" type="datetimeFigureOut">
               <a:rPr lang="zh-TW" altLang="en-US" smtClean="0"/>
               <a:pPr/>
-              <a:t>2018/8/4</a:t>
+              <a:t>2020/9/4</a:t>
             </a:fld>
             <a:endParaRPr lang="zh-TW" altLang="en-US"/>
           </a:p>
@@ -1962,7 +1981,7 @@
             <a:fld id="{212F838A-6F4B-4BB1-BACD-B06005FD32E3}" type="datetimeFigureOut">
               <a:rPr lang="zh-TW" altLang="en-US" smtClean="0"/>
               <a:pPr/>
-              <a:t>2018/8/4</a:t>
+              <a:t>2020/9/4</a:t>
             </a:fld>
             <a:endParaRPr lang="zh-TW" altLang="en-US"/>
           </a:p>
@@ -2048,8 +2067,8 @@
         </p:nvSpPr>
         <p:spPr>
           <a:xfrm>
-            <a:off x="457200" y="273050"/>
-            <a:ext cx="3008313" cy="1162050"/>
+            <a:off x="609601" y="273050"/>
+            <a:ext cx="4011084" cy="1162050"/>
           </a:xfrm>
         </p:spPr>
         <p:txBody>
@@ -2080,8 +2099,8 @@
         </p:nvSpPr>
         <p:spPr>
           <a:xfrm>
-            <a:off x="3575050" y="273050"/>
-            <a:ext cx="5111750" cy="5853113"/>
+            <a:off x="4766733" y="273051"/>
+            <a:ext cx="6815667" cy="5853113"/>
           </a:xfrm>
         </p:spPr>
         <p:txBody>
@@ -2165,8 +2184,8 @@
         </p:nvSpPr>
         <p:spPr>
           <a:xfrm>
-            <a:off x="457200" y="1435100"/>
-            <a:ext cx="3008313" cy="4691063"/>
+            <a:off x="609601" y="1435101"/>
+            <a:ext cx="4011084" cy="4691063"/>
           </a:xfrm>
         </p:spPr>
         <p:txBody>
@@ -2236,7 +2255,7 @@
             <a:fld id="{212F838A-6F4B-4BB1-BACD-B06005FD32E3}" type="datetimeFigureOut">
               <a:rPr lang="zh-TW" altLang="en-US" smtClean="0"/>
               <a:pPr/>
-              <a:t>2018/8/4</a:t>
+              <a:t>2020/9/4</a:t>
             </a:fld>
             <a:endParaRPr lang="zh-TW" altLang="en-US"/>
           </a:p>
@@ -2322,8 +2341,8 @@
         </p:nvSpPr>
         <p:spPr>
           <a:xfrm>
-            <a:off x="1792288" y="4800600"/>
-            <a:ext cx="5486400" cy="566738"/>
+            <a:off x="2389717" y="4800600"/>
+            <a:ext cx="7315200" cy="566738"/>
           </a:xfrm>
         </p:spPr>
         <p:txBody>
@@ -2354,8 +2373,8 @@
         </p:nvSpPr>
         <p:spPr>
           <a:xfrm>
-            <a:off x="1792288" y="612775"/>
-            <a:ext cx="5486400" cy="4114800"/>
+            <a:off x="2389717" y="612775"/>
+            <a:ext cx="7315200" cy="4114800"/>
           </a:xfrm>
         </p:spPr>
         <p:txBody>
@@ -2419,8 +2438,8 @@
         </p:nvSpPr>
         <p:spPr>
           <a:xfrm>
-            <a:off x="1792288" y="5367338"/>
-            <a:ext cx="5486400" cy="804862"/>
+            <a:off x="2389717" y="5367338"/>
+            <a:ext cx="7315200" cy="804862"/>
           </a:xfrm>
         </p:spPr>
         <p:txBody>
@@ -2490,7 +2509,7 @@
             <a:fld id="{212F838A-6F4B-4BB1-BACD-B06005FD32E3}" type="datetimeFigureOut">
               <a:rPr lang="zh-TW" altLang="en-US" smtClean="0"/>
               <a:pPr/>
-              <a:t>2018/8/4</a:t>
+              <a:t>2020/9/4</a:t>
             </a:fld>
             <a:endParaRPr lang="zh-TW" altLang="en-US"/>
           </a:p>
@@ -2586,8 +2605,8 @@
         </p:nvSpPr>
         <p:spPr>
           <a:xfrm>
-            <a:off x="457200" y="274638"/>
-            <a:ext cx="8229600" cy="1143000"/>
+            <a:off x="609600" y="274638"/>
+            <a:ext cx="10972800" cy="1143000"/>
           </a:xfrm>
           <a:prstGeom prst="rect">
             <a:avLst/>
@@ -2619,8 +2638,8 @@
         </p:nvSpPr>
         <p:spPr>
           <a:xfrm>
-            <a:off x="457200" y="1600200"/>
-            <a:ext cx="8229600" cy="4525963"/>
+            <a:off x="609600" y="1600201"/>
+            <a:ext cx="10972800" cy="4525963"/>
           </a:xfrm>
           <a:prstGeom prst="rect">
             <a:avLst/>
@@ -2681,8 +2700,8 @@
         </p:nvSpPr>
         <p:spPr>
           <a:xfrm>
-            <a:off x="457200" y="6356350"/>
-            <a:ext cx="2133600" cy="365125"/>
+            <a:off x="609600" y="6356351"/>
+            <a:ext cx="2844800" cy="365125"/>
           </a:xfrm>
           <a:prstGeom prst="rect">
             <a:avLst/>
@@ -2705,7 +2724,7 @@
             <a:fld id="{212F838A-6F4B-4BB1-BACD-B06005FD32E3}" type="datetimeFigureOut">
               <a:rPr lang="zh-TW" altLang="en-US" smtClean="0"/>
               <a:pPr/>
-              <a:t>2018/8/4</a:t>
+              <a:t>2020/9/4</a:t>
             </a:fld>
             <a:endParaRPr lang="zh-TW" altLang="en-US"/>
           </a:p>
@@ -2723,8 +2742,8 @@
         </p:nvSpPr>
         <p:spPr>
           <a:xfrm>
-            <a:off x="3124200" y="6356350"/>
-            <a:ext cx="2895600" cy="365125"/>
+            <a:off x="4165600" y="6356351"/>
+            <a:ext cx="3860800" cy="365125"/>
           </a:xfrm>
           <a:prstGeom prst="rect">
             <a:avLst/>
@@ -2760,8 +2779,8 @@
         </p:nvSpPr>
         <p:spPr>
           <a:xfrm>
-            <a:off x="6553200" y="6356350"/>
-            <a:ext cx="2133600" cy="365125"/>
+            <a:off x="8737600" y="6356351"/>
+            <a:ext cx="2844800" cy="365125"/>
           </a:xfrm>
           <a:prstGeom prst="rect">
             <a:avLst/>
@@ -3088,39 +3107,41 @@
         </p:nvSpPr>
         <p:spPr/>
         <p:txBody>
-          <a:bodyPr/>
-          <a:lstStyle/>
-          <a:p>
-            <a:r>
-              <a:rPr lang="zh-TW" altLang="en-US" b="1" dirty="0">
-                <a:solidFill>
-                  <a:srgbClr val="660033"/>
-                </a:solidFill>
-                <a:latin typeface="微軟正黑體" pitchFamily="34" charset="-120"/>
-                <a:ea typeface="微軟正黑體" pitchFamily="34" charset="-120"/>
-              </a:rPr>
-              <a:t>只有寶血</a:t>
-            </a:r>
-          </a:p>
-        </p:txBody>
-      </p:sp>
-      <p:sp>
-        <p:nvSpPr>
-          <p:cNvPr id="5" name="內容版面配置區 4"/>
-          <p:cNvSpPr>
-            <a:spLocks noGrp="1"/>
-          </p:cNvSpPr>
-          <p:nvPr>
-            <p:ph idx="1"/>
-          </p:nvPr>
-        </p:nvSpPr>
-        <p:spPr/>
-        <p:txBody>
           <a:bodyPr>
             <a:normAutofit/>
           </a:bodyPr>
           <a:lstStyle/>
           <a:p>
+            <a:r>
+              <a:rPr lang="zh-TW" altLang="en-US" sz="4800" b="1" dirty="0">
+                <a:solidFill>
+                  <a:srgbClr val="660033"/>
+                </a:solidFill>
+                <a:latin typeface="微軟正黑體" pitchFamily="34" charset="-120"/>
+                <a:ea typeface="微軟正黑體" pitchFamily="34" charset="-120"/>
+              </a:rPr>
+              <a:t>只有寶血</a:t>
+            </a:r>
+          </a:p>
+        </p:txBody>
+      </p:sp>
+      <p:sp>
+        <p:nvSpPr>
+          <p:cNvPr id="5" name="內容版面配置區 4"/>
+          <p:cNvSpPr>
+            <a:spLocks noGrp="1"/>
+          </p:cNvSpPr>
+          <p:nvPr>
+            <p:ph idx="1"/>
+          </p:nvPr>
+        </p:nvSpPr>
+        <p:spPr/>
+        <p:txBody>
+          <a:bodyPr>
+            <a:normAutofit/>
+          </a:bodyPr>
+          <a:lstStyle/>
+          <a:p>
             <a:pPr lvl="0" algn="ctr">
               <a:buNone/>
             </a:pPr>
@@ -3178,6 +3199,538 @@
                 <a:ea typeface="微軟正黑體" pitchFamily="34" charset="-120"/>
               </a:rPr>
               <a:t>只有主耶穌之寶血</a:t>
+            </a:r>
+          </a:p>
+        </p:txBody>
+      </p:sp>
+      <p:sp>
+        <p:nvSpPr>
+          <p:cNvPr id="2" name="TextBox 1"/>
+          <p:cNvSpPr txBox="1"/>
+          <p:nvPr/>
+        </p:nvSpPr>
+        <p:spPr>
+          <a:xfrm>
+            <a:off x="1415480" y="1772816"/>
+            <a:ext cx="1008112" cy="830997"/>
+          </a:xfrm>
+          <a:prstGeom prst="rect">
+            <a:avLst/>
+          </a:prstGeom>
+          <a:noFill/>
+        </p:spPr>
+        <p:txBody>
+          <a:bodyPr wrap="square" rtlCol="0">
+            <a:spAutoFit/>
+          </a:bodyPr>
+          <a:lstStyle/>
+          <a:p>
+            <a:r>
+              <a:rPr lang="en-US" sz="4800" b="1" dirty="0">
+                <a:solidFill>
+                  <a:srgbClr val="660033"/>
+                </a:solidFill>
+                <a:ea typeface="微軟正黑體" pitchFamily="34" charset="-120"/>
+              </a:rPr>
+              <a:t>1.</a:t>
+            </a:r>
+            <a:endParaRPr lang="vi-VN" sz="4800" b="1" dirty="0">
+              <a:solidFill>
+                <a:srgbClr val="660033"/>
+              </a:solidFill>
+              <a:ea typeface="微軟正黑體" pitchFamily="34" charset="-120"/>
+            </a:endParaRPr>
+          </a:p>
+        </p:txBody>
+      </p:sp>
+    </p:spTree>
+  </p:cSld>
+  <p:clrMapOvr>
+    <a:masterClrMapping/>
+  </p:clrMapOvr>
+</p:sld>
+</file>
+
+<file path=ppt/slides/slide10.xml><?xml version="1.0" encoding="utf-8"?>
+<p:sld xmlns:a="http://schemas.openxmlformats.org/drawingml/2006/main" xmlns:r="http://schemas.openxmlformats.org/officeDocument/2006/relationships" xmlns:p="http://schemas.openxmlformats.org/presentationml/2006/main">
+  <p:cSld>
+    <p:spTree>
+      <p:nvGrpSpPr>
+        <p:cNvPr id="1" name=""/>
+        <p:cNvGrpSpPr/>
+        <p:nvPr/>
+      </p:nvGrpSpPr>
+      <p:grpSpPr>
+        <a:xfrm>
+          <a:off x="0" y="0"/>
+          <a:ext cx="0" cy="0"/>
+          <a:chOff x="0" y="0"/>
+          <a:chExt cx="0" cy="0"/>
+        </a:xfrm>
+      </p:grpSpPr>
+      <p:sp>
+        <p:nvSpPr>
+          <p:cNvPr id="4" name="標題 3"/>
+          <p:cNvSpPr>
+            <a:spLocks noGrp="1"/>
+          </p:cNvSpPr>
+          <p:nvPr>
+            <p:ph type="title"/>
+          </p:nvPr>
+        </p:nvSpPr>
+        <p:spPr/>
+        <p:txBody>
+          <a:bodyPr>
+            <a:normAutofit/>
+          </a:bodyPr>
+          <a:lstStyle/>
+          <a:p>
+            <a:r>
+              <a:rPr lang="zh-TW" altLang="en-US" sz="4800" b="1" dirty="0">
+                <a:solidFill>
+                  <a:srgbClr val="660033"/>
+                </a:solidFill>
+                <a:latin typeface="微軟正黑體" pitchFamily="34" charset="-120"/>
+                <a:ea typeface="微軟正黑體" pitchFamily="34" charset="-120"/>
+              </a:rPr>
+              <a:t>只有寶血</a:t>
+            </a:r>
+          </a:p>
+        </p:txBody>
+      </p:sp>
+      <p:sp>
+        <p:nvSpPr>
+          <p:cNvPr id="5" name="內容版面配置區 4"/>
+          <p:cNvSpPr>
+            <a:spLocks noGrp="1"/>
+          </p:cNvSpPr>
+          <p:nvPr>
+            <p:ph idx="1"/>
+          </p:nvPr>
+        </p:nvSpPr>
+        <p:spPr/>
+        <p:txBody>
+          <a:bodyPr>
+            <a:normAutofit/>
+          </a:bodyPr>
+          <a:lstStyle/>
+          <a:p>
+            <a:pPr algn="ctr">
+              <a:buNone/>
+            </a:pPr>
+            <a:r>
+              <a:rPr lang="zh-TW" altLang="en-US" sz="5400" b="1" dirty="0">
+                <a:solidFill>
+                  <a:srgbClr val="660033"/>
+                </a:solidFill>
+                <a:latin typeface="微軟正黑體" pitchFamily="34" charset="-120"/>
+                <a:ea typeface="微軟正黑體" pitchFamily="34" charset="-120"/>
+              </a:rPr>
+              <a:t>主在十架流血</a:t>
+            </a:r>
+          </a:p>
+          <a:p>
+            <a:pPr algn="ctr">
+              <a:buNone/>
+            </a:pPr>
+            <a:r>
+              <a:rPr lang="zh-TW" altLang="en-US" sz="5400" b="1" dirty="0">
+                <a:solidFill>
+                  <a:srgbClr val="660033"/>
+                </a:solidFill>
+                <a:latin typeface="微軟正黑體" pitchFamily="34" charset="-120"/>
+                <a:ea typeface="微軟正黑體" pitchFamily="34" charset="-120"/>
+              </a:rPr>
+              <a:t>洗我罪惡清潔</a:t>
+            </a:r>
+          </a:p>
+          <a:p>
+            <a:pPr algn="ctr">
+              <a:buNone/>
+            </a:pPr>
+            <a:r>
+              <a:rPr lang="zh-TW" altLang="en-US" sz="5400" b="1" dirty="0">
+                <a:solidFill>
+                  <a:srgbClr val="660033"/>
+                </a:solidFill>
+                <a:latin typeface="微軟正黑體" pitchFamily="34" charset="-120"/>
+                <a:ea typeface="微軟正黑體" pitchFamily="34" charset="-120"/>
+              </a:rPr>
+              <a:t>使我白超乎雪</a:t>
+            </a:r>
+          </a:p>
+          <a:p>
+            <a:pPr algn="ctr">
+              <a:buNone/>
+            </a:pPr>
+            <a:r>
+              <a:rPr lang="zh-TW" altLang="en-US" sz="5400" b="1" dirty="0">
+                <a:solidFill>
+                  <a:srgbClr val="660033"/>
+                </a:solidFill>
+                <a:latin typeface="微軟正黑體" pitchFamily="34" charset="-120"/>
+                <a:ea typeface="微軟正黑體" pitchFamily="34" charset="-120"/>
+              </a:rPr>
+              <a:t>全賴主耶穌之寶血</a:t>
+            </a:r>
+          </a:p>
+        </p:txBody>
+      </p:sp>
+    </p:spTree>
+    <p:extLst>
+      <p:ext uri="{BB962C8B-B14F-4D97-AF65-F5344CB8AC3E}">
+        <p14:creationId xmlns:p14="http://schemas.microsoft.com/office/powerpoint/2010/main" val="2190578349"/>
+      </p:ext>
+    </p:extLst>
+  </p:cSld>
+  <p:clrMapOvr>
+    <a:masterClrMapping/>
+  </p:clrMapOvr>
+</p:sld>
+</file>
+
+<file path=ppt/slides/slide11.xml><?xml version="1.0" encoding="utf-8"?>
+<p:sld xmlns:a="http://schemas.openxmlformats.org/drawingml/2006/main" xmlns:r="http://schemas.openxmlformats.org/officeDocument/2006/relationships" xmlns:p="http://schemas.openxmlformats.org/presentationml/2006/main">
+  <p:cSld>
+    <p:spTree>
+      <p:nvGrpSpPr>
+        <p:cNvPr id="1" name=""/>
+        <p:cNvGrpSpPr/>
+        <p:nvPr/>
+      </p:nvGrpSpPr>
+      <p:grpSpPr>
+        <a:xfrm>
+          <a:off x="0" y="0"/>
+          <a:ext cx="0" cy="0"/>
+          <a:chOff x="0" y="0"/>
+          <a:chExt cx="0" cy="0"/>
+        </a:xfrm>
+      </p:grpSpPr>
+      <p:sp>
+        <p:nvSpPr>
+          <p:cNvPr id="4" name="標題 3"/>
+          <p:cNvSpPr>
+            <a:spLocks noGrp="1"/>
+          </p:cNvSpPr>
+          <p:nvPr>
+            <p:ph type="title"/>
+          </p:nvPr>
+        </p:nvSpPr>
+        <p:spPr/>
+        <p:txBody>
+          <a:bodyPr>
+            <a:normAutofit/>
+          </a:bodyPr>
+          <a:lstStyle/>
+          <a:p>
+            <a:r>
+              <a:rPr lang="zh-TW" altLang="en-US" sz="4800" b="1" dirty="0">
+                <a:solidFill>
+                  <a:srgbClr val="660033"/>
+                </a:solidFill>
+                <a:latin typeface="微軟正黑體" pitchFamily="34" charset="-120"/>
+                <a:ea typeface="微軟正黑體" pitchFamily="34" charset="-120"/>
+              </a:rPr>
+              <a:t>只有寶血</a:t>
+            </a:r>
+          </a:p>
+        </p:txBody>
+      </p:sp>
+      <p:sp>
+        <p:nvSpPr>
+          <p:cNvPr id="5" name="內容版面配置區 4"/>
+          <p:cNvSpPr>
+            <a:spLocks noGrp="1"/>
+          </p:cNvSpPr>
+          <p:nvPr>
+            <p:ph idx="1"/>
+          </p:nvPr>
+        </p:nvSpPr>
+        <p:spPr/>
+        <p:txBody>
+          <a:bodyPr>
+            <a:normAutofit/>
+          </a:bodyPr>
+          <a:lstStyle/>
+          <a:p>
+            <a:pPr lvl="0" algn="ctr">
+              <a:buNone/>
+            </a:pPr>
+            <a:r>
+              <a:rPr lang="zh-CN" altLang="en-US" sz="5400" b="1" dirty="0">
+                <a:solidFill>
+                  <a:srgbClr val="660033"/>
+                </a:solidFill>
+                <a:latin typeface="微軟正黑體" pitchFamily="34" charset="-120"/>
+                <a:ea typeface="微軟正黑體" pitchFamily="34" charset="-120"/>
+              </a:rPr>
+              <a:t>尊</a:t>
+            </a:r>
+            <a:r>
+              <a:rPr lang="zh-CN" altLang="en-US" sz="5400" b="1" dirty="0" smtClean="0">
+                <a:solidFill>
+                  <a:srgbClr val="660033"/>
+                </a:solidFill>
+                <a:latin typeface="微軟正黑體" pitchFamily="34" charset="-120"/>
+                <a:ea typeface="微軟正黑體" pitchFamily="34" charset="-120"/>
+              </a:rPr>
+              <a:t>貴榮耀並頌讚</a:t>
+            </a:r>
+            <a:endParaRPr lang="en-US" altLang="zh-CN" sz="5400" b="1" dirty="0" smtClean="0">
+              <a:solidFill>
+                <a:srgbClr val="660033"/>
+              </a:solidFill>
+              <a:latin typeface="微軟正黑體" pitchFamily="34" charset="-120"/>
+              <a:ea typeface="微軟正黑體" pitchFamily="34" charset="-120"/>
+            </a:endParaRPr>
+          </a:p>
+          <a:p>
+            <a:pPr lvl="0" algn="ctr">
+              <a:buNone/>
+            </a:pPr>
+            <a:r>
+              <a:rPr lang="zh-CN" altLang="en-US" sz="5400" b="1" dirty="0" smtClean="0">
+                <a:solidFill>
+                  <a:srgbClr val="660033"/>
+                </a:solidFill>
+                <a:latin typeface="微軟正黑體" pitchFamily="34" charset="-120"/>
+                <a:ea typeface="微軟正黑體" pitchFamily="34" charset="-120"/>
+              </a:rPr>
+              <a:t>歸與主耶穌之寶血</a:t>
+            </a:r>
+            <a:endParaRPr lang="en-US" altLang="zh-CN" sz="5400" b="1" dirty="0" smtClean="0">
+              <a:solidFill>
+                <a:srgbClr val="660033"/>
+              </a:solidFill>
+              <a:latin typeface="微軟正黑體" pitchFamily="34" charset="-120"/>
+              <a:ea typeface="微軟正黑體" pitchFamily="34" charset="-120"/>
+            </a:endParaRPr>
+          </a:p>
+          <a:p>
+            <a:pPr algn="ctr">
+              <a:buNone/>
+            </a:pPr>
+            <a:r>
+              <a:rPr lang="zh-CN" altLang="en-US" sz="5400" b="1" dirty="0">
+                <a:solidFill>
+                  <a:srgbClr val="660033"/>
+                </a:solidFill>
+                <a:latin typeface="微軟正黑體" pitchFamily="34" charset="-120"/>
+                <a:ea typeface="微軟正黑體" pitchFamily="34" charset="-120"/>
+              </a:rPr>
+              <a:t>尊貴榮耀並頌讚</a:t>
+            </a:r>
+            <a:endParaRPr lang="en-US" altLang="zh-CN" sz="5400" b="1" dirty="0">
+              <a:solidFill>
+                <a:srgbClr val="660033"/>
+              </a:solidFill>
+              <a:latin typeface="微軟正黑體" pitchFamily="34" charset="-120"/>
+              <a:ea typeface="微軟正黑體" pitchFamily="34" charset="-120"/>
+            </a:endParaRPr>
+          </a:p>
+          <a:p>
+            <a:pPr algn="ctr">
+              <a:buNone/>
+            </a:pPr>
+            <a:r>
+              <a:rPr lang="zh-CN" altLang="en-US" sz="5400" b="1" dirty="0">
+                <a:solidFill>
+                  <a:srgbClr val="660033"/>
+                </a:solidFill>
+                <a:latin typeface="微軟正黑體" pitchFamily="34" charset="-120"/>
+                <a:ea typeface="微軟正黑體" pitchFamily="34" charset="-120"/>
+              </a:rPr>
+              <a:t>歸與主耶穌之寶</a:t>
+            </a:r>
+            <a:r>
+              <a:rPr lang="zh-CN" altLang="en-US" sz="5400" b="1" dirty="0" smtClean="0">
+                <a:solidFill>
+                  <a:srgbClr val="660033"/>
+                </a:solidFill>
+                <a:latin typeface="微軟正黑體" pitchFamily="34" charset="-120"/>
+                <a:ea typeface="微軟正黑體" pitchFamily="34" charset="-120"/>
+              </a:rPr>
+              <a:t>血</a:t>
+            </a:r>
+            <a:endParaRPr lang="en-US" altLang="zh-CN" sz="5400" b="1" dirty="0">
+              <a:solidFill>
+                <a:srgbClr val="660033"/>
+              </a:solidFill>
+              <a:latin typeface="微軟正黑體" pitchFamily="34" charset="-120"/>
+              <a:ea typeface="微軟正黑體" pitchFamily="34" charset="-120"/>
+            </a:endParaRPr>
+          </a:p>
+        </p:txBody>
+      </p:sp>
+      <p:sp>
+        <p:nvSpPr>
+          <p:cNvPr id="6" name="TextBox 5"/>
+          <p:cNvSpPr txBox="1"/>
+          <p:nvPr/>
+        </p:nvSpPr>
+        <p:spPr>
+          <a:xfrm>
+            <a:off x="1415480" y="1772816"/>
+            <a:ext cx="1008112" cy="830997"/>
+          </a:xfrm>
+          <a:prstGeom prst="rect">
+            <a:avLst/>
+          </a:prstGeom>
+          <a:noFill/>
+        </p:spPr>
+        <p:txBody>
+          <a:bodyPr wrap="square" rtlCol="0">
+            <a:spAutoFit/>
+          </a:bodyPr>
+          <a:lstStyle/>
+          <a:p>
+            <a:r>
+              <a:rPr lang="en-US" sz="4800" b="1" dirty="0" smtClean="0">
+                <a:solidFill>
+                  <a:srgbClr val="660033"/>
+                </a:solidFill>
+                <a:ea typeface="微軟正黑體" pitchFamily="34" charset="-120"/>
+              </a:rPr>
+              <a:t>6.</a:t>
+            </a:r>
+            <a:endParaRPr lang="vi-VN" sz="4800" b="1" dirty="0">
+              <a:solidFill>
+                <a:srgbClr val="660033"/>
+              </a:solidFill>
+              <a:ea typeface="微軟正黑體" pitchFamily="34" charset="-120"/>
+            </a:endParaRPr>
+          </a:p>
+        </p:txBody>
+      </p:sp>
+    </p:spTree>
+  </p:cSld>
+  <p:clrMapOvr>
+    <a:masterClrMapping/>
+  </p:clrMapOvr>
+</p:sld>
+</file>
+
+<file path=ppt/slides/slide12.xml><?xml version="1.0" encoding="utf-8"?>
+<p:sld xmlns:a="http://schemas.openxmlformats.org/drawingml/2006/main" xmlns:r="http://schemas.openxmlformats.org/officeDocument/2006/relationships" xmlns:p="http://schemas.openxmlformats.org/presentationml/2006/main">
+  <p:cSld>
+    <p:spTree>
+      <p:nvGrpSpPr>
+        <p:cNvPr id="1" name=""/>
+        <p:cNvGrpSpPr/>
+        <p:nvPr/>
+      </p:nvGrpSpPr>
+      <p:grpSpPr>
+        <a:xfrm>
+          <a:off x="0" y="0"/>
+          <a:ext cx="0" cy="0"/>
+          <a:chOff x="0" y="0"/>
+          <a:chExt cx="0" cy="0"/>
+        </a:xfrm>
+      </p:grpSpPr>
+      <p:sp>
+        <p:nvSpPr>
+          <p:cNvPr id="4" name="標題 3"/>
+          <p:cNvSpPr>
+            <a:spLocks noGrp="1"/>
+          </p:cNvSpPr>
+          <p:nvPr>
+            <p:ph type="title"/>
+          </p:nvPr>
+        </p:nvSpPr>
+        <p:spPr/>
+        <p:txBody>
+          <a:bodyPr>
+            <a:normAutofit/>
+          </a:bodyPr>
+          <a:lstStyle/>
+          <a:p>
+            <a:r>
+              <a:rPr lang="zh-TW" altLang="en-US" sz="4800" b="1" dirty="0">
+                <a:solidFill>
+                  <a:srgbClr val="660033"/>
+                </a:solidFill>
+                <a:latin typeface="微軟正黑體" pitchFamily="34" charset="-120"/>
+                <a:ea typeface="微軟正黑體" pitchFamily="34" charset="-120"/>
+              </a:rPr>
+              <a:t>只有寶血</a:t>
+            </a:r>
+          </a:p>
+        </p:txBody>
+      </p:sp>
+      <p:sp>
+        <p:nvSpPr>
+          <p:cNvPr id="5" name="內容版面配置區 4"/>
+          <p:cNvSpPr>
+            <a:spLocks noGrp="1"/>
+          </p:cNvSpPr>
+          <p:nvPr>
+            <p:ph idx="1"/>
+          </p:nvPr>
+        </p:nvSpPr>
+        <p:spPr/>
+        <p:txBody>
+          <a:bodyPr>
+            <a:normAutofit/>
+          </a:bodyPr>
+          <a:lstStyle/>
+          <a:p>
+            <a:pPr algn="ctr">
+              <a:buNone/>
+            </a:pPr>
+            <a:r>
+              <a:rPr lang="zh-TW" altLang="en-US" sz="5400" b="1" dirty="0">
+                <a:solidFill>
+                  <a:srgbClr val="660033"/>
+                </a:solidFill>
+                <a:latin typeface="微軟正黑體" pitchFamily="34" charset="-120"/>
+                <a:ea typeface="微軟正黑體" pitchFamily="34" charset="-120"/>
+              </a:rPr>
+              <a:t>主在十架流血</a:t>
+            </a:r>
+          </a:p>
+          <a:p>
+            <a:pPr algn="ctr">
+              <a:buNone/>
+            </a:pPr>
+            <a:r>
+              <a:rPr lang="zh-TW" altLang="en-US" sz="5400" b="1" dirty="0">
+                <a:solidFill>
+                  <a:srgbClr val="660033"/>
+                </a:solidFill>
+                <a:latin typeface="微軟正黑體" pitchFamily="34" charset="-120"/>
+                <a:ea typeface="微軟正黑體" pitchFamily="34" charset="-120"/>
+              </a:rPr>
+              <a:t>洗我罪惡清潔</a:t>
+            </a:r>
+          </a:p>
+          <a:p>
+            <a:pPr algn="ctr">
+              <a:buNone/>
+            </a:pPr>
+            <a:r>
+              <a:rPr lang="zh-TW" altLang="en-US" sz="5400" b="1" dirty="0">
+                <a:solidFill>
+                  <a:srgbClr val="660033"/>
+                </a:solidFill>
+                <a:latin typeface="微軟正黑體" pitchFamily="34" charset="-120"/>
+                <a:ea typeface="微軟正黑體" pitchFamily="34" charset="-120"/>
+              </a:rPr>
+              <a:t>使我白超乎雪</a:t>
+            </a:r>
+          </a:p>
+          <a:p>
+            <a:pPr algn="ctr">
+              <a:buNone/>
+            </a:pPr>
+            <a:r>
+              <a:rPr lang="zh-TW" altLang="en-US" sz="5400" b="1" dirty="0">
+                <a:solidFill>
+                  <a:srgbClr val="660033"/>
+                </a:solidFill>
+                <a:latin typeface="微軟正黑體" pitchFamily="34" charset="-120"/>
+                <a:ea typeface="微軟正黑體" pitchFamily="34" charset="-120"/>
+              </a:rPr>
+              <a:t>全賴主耶穌之寶血</a:t>
             </a:r>
           </a:p>
         </p:txBody>
@@ -3219,40 +3772,42 @@
         </p:nvSpPr>
         <p:spPr/>
         <p:txBody>
-          <a:bodyPr/>
-          <a:lstStyle/>
-          <a:p>
-            <a:r>
-              <a:rPr lang="zh-TW" altLang="en-US" b="1" dirty="0">
-                <a:solidFill>
-                  <a:srgbClr val="660033"/>
-                </a:solidFill>
-                <a:latin typeface="微軟正黑體" pitchFamily="34" charset="-120"/>
-                <a:ea typeface="微軟正黑體" pitchFamily="34" charset="-120"/>
-              </a:rPr>
-              <a:t>只有寶血</a:t>
-            </a:r>
-          </a:p>
-        </p:txBody>
-      </p:sp>
-      <p:sp>
-        <p:nvSpPr>
-          <p:cNvPr id="5" name="內容版面配置區 4"/>
-          <p:cNvSpPr>
-            <a:spLocks noGrp="1"/>
-          </p:cNvSpPr>
-          <p:nvPr>
-            <p:ph idx="1"/>
-          </p:nvPr>
-        </p:nvSpPr>
-        <p:spPr/>
-        <p:txBody>
           <a:bodyPr>
             <a:normAutofit/>
           </a:bodyPr>
           <a:lstStyle/>
           <a:p>
-            <a:pPr lvl="0" algn="ctr">
+            <a:r>
+              <a:rPr lang="zh-TW" altLang="en-US" sz="4800" b="1" dirty="0">
+                <a:solidFill>
+                  <a:srgbClr val="660033"/>
+                </a:solidFill>
+                <a:latin typeface="微軟正黑體" pitchFamily="34" charset="-120"/>
+                <a:ea typeface="微軟正黑體" pitchFamily="34" charset="-120"/>
+              </a:rPr>
+              <a:t>只有寶血</a:t>
+            </a:r>
+          </a:p>
+        </p:txBody>
+      </p:sp>
+      <p:sp>
+        <p:nvSpPr>
+          <p:cNvPr id="5" name="內容版面配置區 4"/>
+          <p:cNvSpPr>
+            <a:spLocks noGrp="1"/>
+          </p:cNvSpPr>
+          <p:nvPr>
+            <p:ph idx="1"/>
+          </p:nvPr>
+        </p:nvSpPr>
+        <p:spPr/>
+        <p:txBody>
+          <a:bodyPr>
+            <a:normAutofit/>
+          </a:bodyPr>
+          <a:lstStyle/>
+          <a:p>
+            <a:pPr algn="ctr">
               <a:buNone/>
             </a:pPr>
             <a:r>
@@ -3263,7 +3818,7 @@
                 <a:latin typeface="微軟正黑體" pitchFamily="34" charset="-120"/>
                 <a:ea typeface="微軟正黑體" pitchFamily="34" charset="-120"/>
               </a:rPr>
-              <a:t>何能救贖我罪人</a:t>
+              <a:t>主在十架流血</a:t>
             </a:r>
           </a:p>
           <a:p>
@@ -3278,7 +3833,7 @@
                 <a:latin typeface="微軟正黑體" pitchFamily="34" charset="-120"/>
                 <a:ea typeface="微軟正黑體" pitchFamily="34" charset="-120"/>
               </a:rPr>
-              <a:t>只有主耶穌之寶血</a:t>
+              <a:t>洗我罪惡清潔</a:t>
             </a:r>
           </a:p>
           <a:p>
@@ -3293,7 +3848,7 @@
                 <a:latin typeface="微軟正黑體" pitchFamily="34" charset="-120"/>
                 <a:ea typeface="微軟正黑體" pitchFamily="34" charset="-120"/>
               </a:rPr>
-              <a:t>何能使我近真神</a:t>
+              <a:t>使我白超乎雪</a:t>
             </a:r>
           </a:p>
           <a:p>
@@ -3308,12 +3863,17 @@
                 <a:latin typeface="微軟正黑體" pitchFamily="34" charset="-120"/>
                 <a:ea typeface="微軟正黑體" pitchFamily="34" charset="-120"/>
               </a:rPr>
-              <a:t>只有主耶穌之寶血</a:t>
+              <a:t>全賴主耶穌之寶血</a:t>
             </a:r>
           </a:p>
         </p:txBody>
       </p:sp>
     </p:spTree>
+    <p:extLst>
+      <p:ext uri="{BB962C8B-B14F-4D97-AF65-F5344CB8AC3E}">
+        <p14:creationId xmlns:p14="http://schemas.microsoft.com/office/powerpoint/2010/main" val="1482074734"/>
+      </p:ext>
+    </p:extLst>
   </p:cSld>
   <p:clrMapOvr>
     <a:masterClrMapping/>
@@ -3350,39 +3910,56 @@
         </p:nvSpPr>
         <p:spPr/>
         <p:txBody>
-          <a:bodyPr/>
-          <a:lstStyle/>
-          <a:p>
-            <a:r>
-              <a:rPr lang="zh-TW" altLang="en-US" b="1" dirty="0">
-                <a:solidFill>
-                  <a:srgbClr val="660033"/>
-                </a:solidFill>
-                <a:latin typeface="微軟正黑體" pitchFamily="34" charset="-120"/>
-                <a:ea typeface="微軟正黑體" pitchFamily="34" charset="-120"/>
-              </a:rPr>
-              <a:t>只有寶血</a:t>
-            </a:r>
-          </a:p>
-        </p:txBody>
-      </p:sp>
-      <p:sp>
-        <p:nvSpPr>
-          <p:cNvPr id="5" name="內容版面配置區 4"/>
-          <p:cNvSpPr>
-            <a:spLocks noGrp="1"/>
-          </p:cNvSpPr>
-          <p:nvPr>
-            <p:ph idx="1"/>
-          </p:nvPr>
-        </p:nvSpPr>
-        <p:spPr/>
-        <p:txBody>
           <a:bodyPr>
             <a:normAutofit/>
           </a:bodyPr>
           <a:lstStyle/>
           <a:p>
+            <a:r>
+              <a:rPr lang="zh-TW" altLang="en-US" sz="4800" b="1" dirty="0">
+                <a:solidFill>
+                  <a:srgbClr val="660033"/>
+                </a:solidFill>
+                <a:latin typeface="微軟正黑體" pitchFamily="34" charset="-120"/>
+                <a:ea typeface="微軟正黑體" pitchFamily="34" charset="-120"/>
+              </a:rPr>
+              <a:t>只有寶血</a:t>
+            </a:r>
+          </a:p>
+        </p:txBody>
+      </p:sp>
+      <p:sp>
+        <p:nvSpPr>
+          <p:cNvPr id="5" name="內容版面配置區 4"/>
+          <p:cNvSpPr>
+            <a:spLocks noGrp="1"/>
+          </p:cNvSpPr>
+          <p:nvPr>
+            <p:ph idx="1"/>
+          </p:nvPr>
+        </p:nvSpPr>
+        <p:spPr/>
+        <p:txBody>
+          <a:bodyPr>
+            <a:normAutofit/>
+          </a:bodyPr>
+          <a:lstStyle/>
+          <a:p>
+            <a:pPr lvl="0" algn="ctr">
+              <a:buNone/>
+            </a:pPr>
+            <a:r>
+              <a:rPr lang="zh-TW" altLang="en-US" sz="5400" b="1" dirty="0">
+                <a:solidFill>
+                  <a:srgbClr val="660033"/>
+                </a:solidFill>
+                <a:latin typeface="微軟正黑體" pitchFamily="34" charset="-120"/>
+                <a:ea typeface="微軟正黑體" pitchFamily="34" charset="-120"/>
+              </a:rPr>
+              <a:t>何能救贖我罪人</a:t>
+            </a:r>
+          </a:p>
+          <a:p>
             <a:pPr algn="ctr">
               <a:buNone/>
             </a:pPr>
@@ -3394,7 +3971,7 @@
                 <a:latin typeface="微軟正黑體" pitchFamily="34" charset="-120"/>
                 <a:ea typeface="微軟正黑體" pitchFamily="34" charset="-120"/>
               </a:rPr>
-              <a:t>主在十架流血</a:t>
+              <a:t>只有主耶穌之寶血</a:t>
             </a:r>
           </a:p>
           <a:p>
@@ -3409,8 +3986,45 @@
                 <a:latin typeface="微軟正黑體" pitchFamily="34" charset="-120"/>
                 <a:ea typeface="微軟正黑體" pitchFamily="34" charset="-120"/>
               </a:rPr>
-              <a:t>洗我罪惡清潔</a:t>
-            </a:r>
+              <a:t>何能使</a:t>
+            </a:r>
+            <a:r>
+              <a:rPr lang="zh-TW" altLang="en-US" sz="5400" b="1" dirty="0" smtClean="0">
+                <a:solidFill>
+                  <a:srgbClr val="660033"/>
+                </a:solidFill>
+                <a:latin typeface="微軟正黑體" pitchFamily="34" charset="-120"/>
+                <a:ea typeface="微軟正黑體" pitchFamily="34" charset="-120"/>
+              </a:rPr>
+              <a:t>我</a:t>
+            </a:r>
+            <a:r>
+              <a:rPr lang="zh-CN" altLang="en-US" sz="5400" b="1" dirty="0">
+                <a:solidFill>
+                  <a:srgbClr val="660033"/>
+                </a:solidFill>
+                <a:latin typeface="微軟正黑體" pitchFamily="34" charset="-120"/>
+                <a:ea typeface="微軟正黑體" pitchFamily="34" charset="-120"/>
+              </a:rPr>
+              <a:t>與</a:t>
+            </a:r>
+            <a:r>
+              <a:rPr lang="zh-TW" altLang="en-US" sz="5400" b="1" dirty="0" smtClean="0">
+                <a:solidFill>
+                  <a:srgbClr val="660033"/>
+                </a:solidFill>
+                <a:latin typeface="微軟正黑體" pitchFamily="34" charset="-120"/>
+                <a:ea typeface="微軟正黑體" pitchFamily="34" charset="-120"/>
+              </a:rPr>
+              <a:t>神近</a:t>
+            </a:r>
+            <a:endParaRPr lang="zh-TW" altLang="en-US" sz="5400" b="1" dirty="0">
+              <a:solidFill>
+                <a:srgbClr val="660033"/>
+              </a:solidFill>
+              <a:latin typeface="微軟正黑體" pitchFamily="34" charset="-120"/>
+              <a:ea typeface="微軟正黑體" pitchFamily="34" charset="-120"/>
+            </a:endParaRPr>
           </a:p>
           <a:p>
             <a:pPr algn="ctr">
@@ -3424,23 +4038,48 @@
                 <a:latin typeface="微軟正黑體" pitchFamily="34" charset="-120"/>
                 <a:ea typeface="微軟正黑體" pitchFamily="34" charset="-120"/>
               </a:rPr>
-              <a:t>使我白超乎雪</a:t>
-            </a:r>
-          </a:p>
-          <a:p>
-            <a:pPr algn="ctr">
-              <a:buNone/>
-            </a:pPr>
-            <a:r>
-              <a:rPr lang="zh-TW" altLang="en-US" sz="5400" b="1" dirty="0">
-                <a:solidFill>
-                  <a:srgbClr val="660033"/>
-                </a:solidFill>
-                <a:latin typeface="微軟正黑體" pitchFamily="34" charset="-120"/>
-                <a:ea typeface="微軟正黑體" pitchFamily="34" charset="-120"/>
-              </a:rPr>
-              <a:t>全賴主耶穌之寶血</a:t>
-            </a:r>
+              <a:t>只有主耶穌之寶血</a:t>
+            </a:r>
+          </a:p>
+        </p:txBody>
+      </p:sp>
+      <p:sp>
+        <p:nvSpPr>
+          <p:cNvPr id="6" name="TextBox 5"/>
+          <p:cNvSpPr txBox="1"/>
+          <p:nvPr/>
+        </p:nvSpPr>
+        <p:spPr>
+          <a:xfrm>
+            <a:off x="1415480" y="1772816"/>
+            <a:ext cx="1008112" cy="830997"/>
+          </a:xfrm>
+          <a:prstGeom prst="rect">
+            <a:avLst/>
+          </a:prstGeom>
+          <a:noFill/>
+        </p:spPr>
+        <p:txBody>
+          <a:bodyPr wrap="square" rtlCol="0">
+            <a:spAutoFit/>
+          </a:bodyPr>
+          <a:lstStyle/>
+          <a:p>
+            <a:r>
+              <a:rPr lang="en-US" sz="4800" b="1" dirty="0" smtClean="0">
+                <a:solidFill>
+                  <a:srgbClr val="660033"/>
+                </a:solidFill>
+                <a:ea typeface="微軟正黑體" pitchFamily="34" charset="-120"/>
+              </a:rPr>
+              <a:t>2.</a:t>
+            </a:r>
+            <a:endParaRPr lang="vi-VN" sz="4800" b="1" dirty="0">
+              <a:solidFill>
+                <a:srgbClr val="660033"/>
+              </a:solidFill>
+              <a:ea typeface="微軟正黑體" pitchFamily="34" charset="-120"/>
+            </a:endParaRPr>
           </a:p>
         </p:txBody>
       </p:sp>
@@ -3481,40 +4120,42 @@
         </p:nvSpPr>
         <p:spPr/>
         <p:txBody>
-          <a:bodyPr/>
-          <a:lstStyle/>
-          <a:p>
-            <a:r>
-              <a:rPr lang="zh-TW" altLang="en-US" b="1" dirty="0">
-                <a:solidFill>
-                  <a:srgbClr val="660033"/>
-                </a:solidFill>
-                <a:latin typeface="微軟正黑體" pitchFamily="34" charset="-120"/>
-                <a:ea typeface="微軟正黑體" pitchFamily="34" charset="-120"/>
-              </a:rPr>
-              <a:t>只有寶血</a:t>
-            </a:r>
-          </a:p>
-        </p:txBody>
-      </p:sp>
-      <p:sp>
-        <p:nvSpPr>
-          <p:cNvPr id="5" name="內容版面配置區 4"/>
-          <p:cNvSpPr>
-            <a:spLocks noGrp="1"/>
-          </p:cNvSpPr>
-          <p:nvPr>
-            <p:ph idx="1"/>
-          </p:nvPr>
-        </p:nvSpPr>
-        <p:spPr/>
-        <p:txBody>
           <a:bodyPr>
             <a:normAutofit/>
           </a:bodyPr>
           <a:lstStyle/>
           <a:p>
-            <a:pPr lvl="0" algn="ctr">
+            <a:r>
+              <a:rPr lang="zh-TW" altLang="en-US" sz="4800" b="1" dirty="0">
+                <a:solidFill>
+                  <a:srgbClr val="660033"/>
+                </a:solidFill>
+                <a:latin typeface="微軟正黑體" pitchFamily="34" charset="-120"/>
+                <a:ea typeface="微軟正黑體" pitchFamily="34" charset="-120"/>
+              </a:rPr>
+              <a:t>只有寶血</a:t>
+            </a:r>
+          </a:p>
+        </p:txBody>
+      </p:sp>
+      <p:sp>
+        <p:nvSpPr>
+          <p:cNvPr id="5" name="內容版面配置區 4"/>
+          <p:cNvSpPr>
+            <a:spLocks noGrp="1"/>
+          </p:cNvSpPr>
+          <p:nvPr>
+            <p:ph idx="1"/>
+          </p:nvPr>
+        </p:nvSpPr>
+        <p:spPr/>
+        <p:txBody>
+          <a:bodyPr>
+            <a:normAutofit/>
+          </a:bodyPr>
+          <a:lstStyle/>
+          <a:p>
+            <a:pPr algn="ctr">
               <a:buNone/>
             </a:pPr>
             <a:r>
@@ -3525,7 +4166,7 @@
                 <a:latin typeface="微軟正黑體" pitchFamily="34" charset="-120"/>
                 <a:ea typeface="微軟正黑體" pitchFamily="34" charset="-120"/>
               </a:rPr>
-              <a:t>何能使我出黑暗</a:t>
+              <a:t>主在十架流血</a:t>
             </a:r>
           </a:p>
           <a:p>
@@ -3540,7 +4181,7 @@
                 <a:latin typeface="微軟正黑體" pitchFamily="34" charset="-120"/>
                 <a:ea typeface="微軟正黑體" pitchFamily="34" charset="-120"/>
               </a:rPr>
-              <a:t>只有主耶穌之寶血</a:t>
+              <a:t>洗我罪惡清潔</a:t>
             </a:r>
           </a:p>
           <a:p>
@@ -3555,7 +4196,7 @@
                 <a:latin typeface="微軟正黑體" pitchFamily="34" charset="-120"/>
                 <a:ea typeface="微軟正黑體" pitchFamily="34" charset="-120"/>
               </a:rPr>
-              <a:t>何能使我入光明</a:t>
+              <a:t>使我白超乎雪</a:t>
             </a:r>
           </a:p>
           <a:p>
@@ -3570,7 +4211,7 @@
                 <a:latin typeface="微軟正黑體" pitchFamily="34" charset="-120"/>
                 <a:ea typeface="微軟正黑體" pitchFamily="34" charset="-120"/>
               </a:rPr>
-              <a:t>只有主耶穌之寶血</a:t>
+              <a:t>全賴主耶穌之寶血</a:t>
             </a:r>
           </a:p>
         </p:txBody>
@@ -3612,39 +4253,41 @@
         </p:nvSpPr>
         <p:spPr/>
         <p:txBody>
-          <a:bodyPr/>
-          <a:lstStyle/>
-          <a:p>
-            <a:r>
-              <a:rPr lang="zh-TW" altLang="en-US" b="1" dirty="0">
-                <a:solidFill>
-                  <a:srgbClr val="660033"/>
-                </a:solidFill>
-                <a:latin typeface="微軟正黑體" pitchFamily="34" charset="-120"/>
-                <a:ea typeface="微軟正黑體" pitchFamily="34" charset="-120"/>
-              </a:rPr>
-              <a:t>只有寶血</a:t>
-            </a:r>
-          </a:p>
-        </p:txBody>
-      </p:sp>
-      <p:sp>
-        <p:nvSpPr>
-          <p:cNvPr id="5" name="內容版面配置區 4"/>
-          <p:cNvSpPr>
-            <a:spLocks noGrp="1"/>
-          </p:cNvSpPr>
-          <p:nvPr>
-            <p:ph idx="1"/>
-          </p:nvPr>
-        </p:nvSpPr>
-        <p:spPr/>
-        <p:txBody>
           <a:bodyPr>
             <a:normAutofit/>
           </a:bodyPr>
           <a:lstStyle/>
           <a:p>
+            <a:r>
+              <a:rPr lang="zh-TW" altLang="en-US" sz="4800" b="1" dirty="0">
+                <a:solidFill>
+                  <a:srgbClr val="660033"/>
+                </a:solidFill>
+                <a:latin typeface="微軟正黑體" pitchFamily="34" charset="-120"/>
+                <a:ea typeface="微軟正黑體" pitchFamily="34" charset="-120"/>
+              </a:rPr>
+              <a:t>只有寶血</a:t>
+            </a:r>
+          </a:p>
+        </p:txBody>
+      </p:sp>
+      <p:sp>
+        <p:nvSpPr>
+          <p:cNvPr id="5" name="內容版面配置區 4"/>
+          <p:cNvSpPr>
+            <a:spLocks noGrp="1"/>
+          </p:cNvSpPr>
+          <p:nvPr>
+            <p:ph idx="1"/>
+          </p:nvPr>
+        </p:nvSpPr>
+        <p:spPr/>
+        <p:txBody>
+          <a:bodyPr>
+            <a:normAutofit/>
+          </a:bodyPr>
+          <a:lstStyle/>
+          <a:p>
             <a:pPr lvl="0" algn="ctr">
               <a:buNone/>
             </a:pPr>
@@ -3703,6 +4346,62 @@
               </a:rPr>
               <a:t>只有主耶穌之寶血</a:t>
             </a:r>
+            <a:endParaRPr lang="zh-TW" altLang="en-US" sz="5400" b="1" dirty="0">
+              <a:solidFill>
+                <a:srgbClr val="660033"/>
+              </a:solidFill>
+              <a:latin typeface="微軟正黑體" pitchFamily="34" charset="-120"/>
+              <a:ea typeface="微軟正黑體" pitchFamily="34" charset="-120"/>
+            </a:endParaRPr>
+          </a:p>
+        </p:txBody>
+      </p:sp>
+      <p:sp>
+        <p:nvSpPr>
+          <p:cNvPr id="6" name="TextBox 5"/>
+          <p:cNvSpPr txBox="1"/>
+          <p:nvPr/>
+        </p:nvSpPr>
+        <p:spPr>
+          <a:xfrm>
+            <a:off x="1415480" y="1772816"/>
+            <a:ext cx="1008112" cy="830997"/>
+          </a:xfrm>
+          <a:prstGeom prst="rect">
+            <a:avLst/>
+          </a:prstGeom>
+          <a:noFill/>
+        </p:spPr>
+        <p:txBody>
+          <a:bodyPr wrap="square" rtlCol="0">
+            <a:spAutoFit/>
+          </a:bodyPr>
+          <a:lstStyle/>
+          <a:p>
+            <a:r>
+              <a:rPr lang="en-US" sz="4800" b="1" dirty="0">
+                <a:solidFill>
+                  <a:srgbClr val="660033"/>
+                </a:solidFill>
+                <a:ea typeface="微軟正黑體" pitchFamily="34" charset="-120"/>
+              </a:rPr>
+              <a:t>3</a:t>
+            </a:r>
+            <a:r>
+              <a:rPr lang="en-US" sz="4800" b="1" dirty="0" smtClean="0">
+                <a:solidFill>
+                  <a:srgbClr val="660033"/>
+                </a:solidFill>
+                <a:ea typeface="微軟正黑體" pitchFamily="34" charset="-120"/>
+              </a:rPr>
+              <a:t>.</a:t>
+            </a:r>
+            <a:endParaRPr lang="vi-VN" sz="4800" b="1" dirty="0">
+              <a:solidFill>
+                <a:srgbClr val="660033"/>
+              </a:solidFill>
+              <a:ea typeface="微軟正黑體" pitchFamily="34" charset="-120"/>
+            </a:endParaRPr>
           </a:p>
         </p:txBody>
       </p:sp>
@@ -3743,39 +4442,41 @@
         </p:nvSpPr>
         <p:spPr/>
         <p:txBody>
-          <a:bodyPr/>
-          <a:lstStyle/>
-          <a:p>
-            <a:r>
-              <a:rPr lang="zh-TW" altLang="en-US" b="1" dirty="0">
-                <a:solidFill>
-                  <a:srgbClr val="660033"/>
-                </a:solidFill>
-                <a:latin typeface="微軟正黑體" pitchFamily="34" charset="-120"/>
-                <a:ea typeface="微軟正黑體" pitchFamily="34" charset="-120"/>
-              </a:rPr>
-              <a:t>只有寶血</a:t>
-            </a:r>
-          </a:p>
-        </p:txBody>
-      </p:sp>
-      <p:sp>
-        <p:nvSpPr>
-          <p:cNvPr id="5" name="內容版面配置區 4"/>
-          <p:cNvSpPr>
-            <a:spLocks noGrp="1"/>
-          </p:cNvSpPr>
-          <p:nvPr>
-            <p:ph idx="1"/>
-          </p:nvPr>
-        </p:nvSpPr>
-        <p:spPr/>
-        <p:txBody>
           <a:bodyPr>
             <a:normAutofit/>
           </a:bodyPr>
           <a:lstStyle/>
           <a:p>
+            <a:r>
+              <a:rPr lang="zh-TW" altLang="en-US" sz="4800" b="1" dirty="0">
+                <a:solidFill>
+                  <a:srgbClr val="660033"/>
+                </a:solidFill>
+                <a:latin typeface="微軟正黑體" pitchFamily="34" charset="-120"/>
+                <a:ea typeface="微軟正黑體" pitchFamily="34" charset="-120"/>
+              </a:rPr>
+              <a:t>只有寶血</a:t>
+            </a:r>
+          </a:p>
+        </p:txBody>
+      </p:sp>
+      <p:sp>
+        <p:nvSpPr>
+          <p:cNvPr id="5" name="內容版面配置區 4"/>
+          <p:cNvSpPr>
+            <a:spLocks noGrp="1"/>
+          </p:cNvSpPr>
+          <p:nvPr>
+            <p:ph idx="1"/>
+          </p:nvPr>
+        </p:nvSpPr>
+        <p:spPr/>
+        <p:txBody>
+          <a:bodyPr>
+            <a:normAutofit/>
+          </a:bodyPr>
+          <a:lstStyle/>
+          <a:p>
             <a:pPr algn="ctr">
               <a:buNone/>
             </a:pPr>
@@ -3838,6 +4539,11 @@
         </p:txBody>
       </p:sp>
     </p:spTree>
+    <p:extLst>
+      <p:ext uri="{BB962C8B-B14F-4D97-AF65-F5344CB8AC3E}">
+        <p14:creationId xmlns:p14="http://schemas.microsoft.com/office/powerpoint/2010/main" val="3063356115"/>
+      </p:ext>
+    </p:extLst>
   </p:cSld>
   <p:clrMapOvr>
     <a:masterClrMapping/>
@@ -3874,39 +4580,41 @@
         </p:nvSpPr>
         <p:spPr/>
         <p:txBody>
-          <a:bodyPr/>
-          <a:lstStyle/>
-          <a:p>
-            <a:r>
-              <a:rPr lang="zh-TW" altLang="en-US" b="1" dirty="0">
-                <a:solidFill>
-                  <a:srgbClr val="660033"/>
-                </a:solidFill>
-                <a:latin typeface="微軟正黑體" pitchFamily="34" charset="-120"/>
-                <a:ea typeface="微軟正黑體" pitchFamily="34" charset="-120"/>
-              </a:rPr>
-              <a:t>只有寶血</a:t>
-            </a:r>
-          </a:p>
-        </p:txBody>
-      </p:sp>
-      <p:sp>
-        <p:nvSpPr>
-          <p:cNvPr id="5" name="內容版面配置區 4"/>
-          <p:cNvSpPr>
-            <a:spLocks noGrp="1"/>
-          </p:cNvSpPr>
-          <p:nvPr>
-            <p:ph idx="1"/>
-          </p:nvPr>
-        </p:nvSpPr>
-        <p:spPr/>
-        <p:txBody>
           <a:bodyPr>
             <a:normAutofit/>
           </a:bodyPr>
           <a:lstStyle/>
           <a:p>
+            <a:r>
+              <a:rPr lang="zh-TW" altLang="en-US" sz="4800" b="1" dirty="0">
+                <a:solidFill>
+                  <a:srgbClr val="660033"/>
+                </a:solidFill>
+                <a:latin typeface="微軟正黑體" pitchFamily="34" charset="-120"/>
+                <a:ea typeface="微軟正黑體" pitchFamily="34" charset="-120"/>
+              </a:rPr>
+              <a:t>只有寶血</a:t>
+            </a:r>
+          </a:p>
+        </p:txBody>
+      </p:sp>
+      <p:sp>
+        <p:nvSpPr>
+          <p:cNvPr id="5" name="內容版面配置區 4"/>
+          <p:cNvSpPr>
+            <a:spLocks noGrp="1"/>
+          </p:cNvSpPr>
+          <p:nvPr>
+            <p:ph idx="1"/>
+          </p:nvPr>
+        </p:nvSpPr>
+        <p:spPr/>
+        <p:txBody>
+          <a:bodyPr>
+            <a:normAutofit/>
+          </a:bodyPr>
+          <a:lstStyle/>
+          <a:p>
             <a:pPr lvl="0" algn="ctr">
               <a:buNone/>
             </a:pPr>
@@ -3965,6 +4673,62 @@
               </a:rPr>
               <a:t>只有主耶穌之寶血</a:t>
             </a:r>
+            <a:endParaRPr lang="zh-TW" altLang="en-US" sz="5400" b="1" dirty="0">
+              <a:solidFill>
+                <a:srgbClr val="660033"/>
+              </a:solidFill>
+              <a:latin typeface="微軟正黑體" pitchFamily="34" charset="-120"/>
+              <a:ea typeface="微軟正黑體" pitchFamily="34" charset="-120"/>
+            </a:endParaRPr>
+          </a:p>
+        </p:txBody>
+      </p:sp>
+      <p:sp>
+        <p:nvSpPr>
+          <p:cNvPr id="6" name="TextBox 5"/>
+          <p:cNvSpPr txBox="1"/>
+          <p:nvPr/>
+        </p:nvSpPr>
+        <p:spPr>
+          <a:xfrm>
+            <a:off x="1415480" y="1772816"/>
+            <a:ext cx="1008112" cy="830997"/>
+          </a:xfrm>
+          <a:prstGeom prst="rect">
+            <a:avLst/>
+          </a:prstGeom>
+          <a:noFill/>
+        </p:spPr>
+        <p:txBody>
+          <a:bodyPr wrap="square" rtlCol="0">
+            <a:spAutoFit/>
+          </a:bodyPr>
+          <a:lstStyle/>
+          <a:p>
+            <a:r>
+              <a:rPr lang="en-US" sz="4800" b="1" dirty="0">
+                <a:solidFill>
+                  <a:srgbClr val="660033"/>
+                </a:solidFill>
+                <a:ea typeface="微軟正黑體" pitchFamily="34" charset="-120"/>
+              </a:rPr>
+              <a:t>4</a:t>
+            </a:r>
+            <a:r>
+              <a:rPr lang="en-US" sz="4800" b="1" dirty="0" smtClean="0">
+                <a:solidFill>
+                  <a:srgbClr val="660033"/>
+                </a:solidFill>
+                <a:ea typeface="微軟正黑體" pitchFamily="34" charset="-120"/>
+              </a:rPr>
+              <a:t>.</a:t>
+            </a:r>
+            <a:endParaRPr lang="vi-VN" sz="4800" b="1" dirty="0">
+              <a:solidFill>
+                <a:srgbClr val="660033"/>
+              </a:solidFill>
+              <a:ea typeface="微軟正黑體" pitchFamily="34" charset="-120"/>
+            </a:endParaRPr>
           </a:p>
         </p:txBody>
       </p:sp>
@@ -4005,40 +4769,42 @@
         </p:nvSpPr>
         <p:spPr/>
         <p:txBody>
-          <a:bodyPr/>
-          <a:lstStyle/>
-          <a:p>
-            <a:r>
-              <a:rPr lang="zh-TW" altLang="en-US" b="1" dirty="0">
-                <a:solidFill>
-                  <a:srgbClr val="660033"/>
-                </a:solidFill>
-                <a:latin typeface="微軟正黑體" pitchFamily="34" charset="-120"/>
-                <a:ea typeface="微軟正黑體" pitchFamily="34" charset="-120"/>
-              </a:rPr>
-              <a:t>只有寶血</a:t>
-            </a:r>
-          </a:p>
-        </p:txBody>
-      </p:sp>
-      <p:sp>
-        <p:nvSpPr>
-          <p:cNvPr id="5" name="內容版面配置區 4"/>
-          <p:cNvSpPr>
-            <a:spLocks noGrp="1"/>
-          </p:cNvSpPr>
-          <p:nvPr>
-            <p:ph idx="1"/>
-          </p:nvPr>
-        </p:nvSpPr>
-        <p:spPr/>
-        <p:txBody>
           <a:bodyPr>
             <a:normAutofit/>
           </a:bodyPr>
           <a:lstStyle/>
           <a:p>
-            <a:pPr lvl="0" algn="ctr">
+            <a:r>
+              <a:rPr lang="zh-TW" altLang="en-US" sz="4800" b="1" dirty="0">
+                <a:solidFill>
+                  <a:srgbClr val="660033"/>
+                </a:solidFill>
+                <a:latin typeface="微軟正黑體" pitchFamily="34" charset="-120"/>
+                <a:ea typeface="微軟正黑體" pitchFamily="34" charset="-120"/>
+              </a:rPr>
+              <a:t>只有寶血</a:t>
+            </a:r>
+          </a:p>
+        </p:txBody>
+      </p:sp>
+      <p:sp>
+        <p:nvSpPr>
+          <p:cNvPr id="5" name="內容版面配置區 4"/>
+          <p:cNvSpPr>
+            <a:spLocks noGrp="1"/>
+          </p:cNvSpPr>
+          <p:nvPr>
+            <p:ph idx="1"/>
+          </p:nvPr>
+        </p:nvSpPr>
+        <p:spPr/>
+        <p:txBody>
+          <a:bodyPr>
+            <a:normAutofit/>
+          </a:bodyPr>
+          <a:lstStyle/>
+          <a:p>
+            <a:pPr algn="ctr">
               <a:buNone/>
             </a:pPr>
             <a:r>
@@ -4049,7 +4815,7 @@
                 <a:latin typeface="微軟正黑體" pitchFamily="34" charset="-120"/>
                 <a:ea typeface="微軟正黑體" pitchFamily="34" charset="-120"/>
               </a:rPr>
-              <a:t>何能使我常得勝</a:t>
+              <a:t>主在十架流血</a:t>
             </a:r>
           </a:p>
           <a:p>
@@ -4064,7 +4830,7 @@
                 <a:latin typeface="微軟正黑體" pitchFamily="34" charset="-120"/>
                 <a:ea typeface="微軟正黑體" pitchFamily="34" charset="-120"/>
               </a:rPr>
-              <a:t>只有主耶穌之寶血</a:t>
+              <a:t>洗我罪惡清潔</a:t>
             </a:r>
           </a:p>
           <a:p>
@@ -4079,7 +4845,7 @@
                 <a:latin typeface="微軟正黑體" pitchFamily="34" charset="-120"/>
                 <a:ea typeface="微軟正黑體" pitchFamily="34" charset="-120"/>
               </a:rPr>
-              <a:t>何能使我得榮耀</a:t>
+              <a:t>使我白超乎雪</a:t>
             </a:r>
           </a:p>
           <a:p>
@@ -4094,7 +4860,7 @@
                 <a:latin typeface="微軟正黑體" pitchFamily="34" charset="-120"/>
                 <a:ea typeface="微軟正黑體" pitchFamily="34" charset="-120"/>
               </a:rPr>
-              <a:t>只有主耶穌之寶血</a:t>
+              <a:t>全賴主耶穌之寶血</a:t>
             </a:r>
           </a:p>
         </p:txBody>
@@ -4136,39 +4902,56 @@
         </p:nvSpPr>
         <p:spPr/>
         <p:txBody>
-          <a:bodyPr/>
-          <a:lstStyle/>
-          <a:p>
-            <a:r>
-              <a:rPr lang="zh-TW" altLang="en-US" b="1" dirty="0">
-                <a:solidFill>
-                  <a:srgbClr val="660033"/>
-                </a:solidFill>
-                <a:latin typeface="微軟正黑體" pitchFamily="34" charset="-120"/>
-                <a:ea typeface="微軟正黑體" pitchFamily="34" charset="-120"/>
-              </a:rPr>
-              <a:t>只有寶血</a:t>
-            </a:r>
-          </a:p>
-        </p:txBody>
-      </p:sp>
-      <p:sp>
-        <p:nvSpPr>
-          <p:cNvPr id="5" name="內容版面配置區 4"/>
-          <p:cNvSpPr>
-            <a:spLocks noGrp="1"/>
-          </p:cNvSpPr>
-          <p:nvPr>
-            <p:ph idx="1"/>
-          </p:nvPr>
-        </p:nvSpPr>
-        <p:spPr/>
-        <p:txBody>
           <a:bodyPr>
             <a:normAutofit/>
           </a:bodyPr>
           <a:lstStyle/>
           <a:p>
+            <a:r>
+              <a:rPr lang="zh-TW" altLang="en-US" sz="4800" b="1" dirty="0">
+                <a:solidFill>
+                  <a:srgbClr val="660033"/>
+                </a:solidFill>
+                <a:latin typeface="微軟正黑體" pitchFamily="34" charset="-120"/>
+                <a:ea typeface="微軟正黑體" pitchFamily="34" charset="-120"/>
+              </a:rPr>
+              <a:t>只有寶血</a:t>
+            </a:r>
+          </a:p>
+        </p:txBody>
+      </p:sp>
+      <p:sp>
+        <p:nvSpPr>
+          <p:cNvPr id="5" name="內容版面配置區 4"/>
+          <p:cNvSpPr>
+            <a:spLocks noGrp="1"/>
+          </p:cNvSpPr>
+          <p:nvPr>
+            <p:ph idx="1"/>
+          </p:nvPr>
+        </p:nvSpPr>
+        <p:spPr/>
+        <p:txBody>
+          <a:bodyPr>
+            <a:normAutofit/>
+          </a:bodyPr>
+          <a:lstStyle/>
+          <a:p>
+            <a:pPr lvl="0" algn="ctr">
+              <a:buNone/>
+            </a:pPr>
+            <a:r>
+              <a:rPr lang="zh-TW" altLang="en-US" sz="5400" b="1" dirty="0">
+                <a:solidFill>
+                  <a:srgbClr val="660033"/>
+                </a:solidFill>
+                <a:latin typeface="微軟正黑體" pitchFamily="34" charset="-120"/>
+                <a:ea typeface="微軟正黑體" pitchFamily="34" charset="-120"/>
+              </a:rPr>
+              <a:t>何能使我常得勝</a:t>
+            </a:r>
+          </a:p>
+          <a:p>
             <a:pPr algn="ctr">
               <a:buNone/>
             </a:pPr>
@@ -4180,7 +4963,7 @@
                 <a:latin typeface="微軟正黑體" pitchFamily="34" charset="-120"/>
                 <a:ea typeface="微軟正黑體" pitchFamily="34" charset="-120"/>
               </a:rPr>
-              <a:t>主在十架流血</a:t>
+              <a:t>只有主耶穌之寶血</a:t>
             </a:r>
           </a:p>
           <a:p>
@@ -4195,7 +4978,7 @@
                 <a:latin typeface="微軟正黑體" pitchFamily="34" charset="-120"/>
                 <a:ea typeface="微軟正黑體" pitchFamily="34" charset="-120"/>
               </a:rPr>
-              <a:t>洗我罪惡清潔</a:t>
+              <a:t>何能使我得榮耀</a:t>
             </a:r>
           </a:p>
           <a:p>
@@ -4210,23 +4993,55 @@
                 <a:latin typeface="微軟正黑體" pitchFamily="34" charset="-120"/>
                 <a:ea typeface="微軟正黑體" pitchFamily="34" charset="-120"/>
               </a:rPr>
-              <a:t>使我白超乎雪</a:t>
-            </a:r>
-          </a:p>
-          <a:p>
-            <a:pPr algn="ctr">
-              <a:buNone/>
-            </a:pPr>
-            <a:r>
-              <a:rPr lang="zh-TW" altLang="en-US" sz="5400" b="1" dirty="0">
-                <a:solidFill>
-                  <a:srgbClr val="660033"/>
-                </a:solidFill>
-                <a:latin typeface="微軟正黑體" pitchFamily="34" charset="-120"/>
-                <a:ea typeface="微軟正黑體" pitchFamily="34" charset="-120"/>
-              </a:rPr>
-              <a:t>全賴主耶穌之寶血</a:t>
-            </a:r>
+              <a:t>只有主耶穌之寶血</a:t>
+            </a:r>
+            <a:endParaRPr lang="zh-TW" altLang="en-US" sz="5400" b="1" dirty="0">
+              <a:solidFill>
+                <a:srgbClr val="660033"/>
+              </a:solidFill>
+              <a:latin typeface="微軟正黑體" pitchFamily="34" charset="-120"/>
+              <a:ea typeface="微軟正黑體" pitchFamily="34" charset="-120"/>
+            </a:endParaRPr>
+          </a:p>
+        </p:txBody>
+      </p:sp>
+      <p:sp>
+        <p:nvSpPr>
+          <p:cNvPr id="6" name="TextBox 5"/>
+          <p:cNvSpPr txBox="1"/>
+          <p:nvPr/>
+        </p:nvSpPr>
+        <p:spPr>
+          <a:xfrm>
+            <a:off x="1415480" y="1772816"/>
+            <a:ext cx="1008112" cy="830997"/>
+          </a:xfrm>
+          <a:prstGeom prst="rect">
+            <a:avLst/>
+          </a:prstGeom>
+          <a:noFill/>
+        </p:spPr>
+        <p:txBody>
+          <a:bodyPr wrap="square" rtlCol="0">
+            <a:spAutoFit/>
+          </a:bodyPr>
+          <a:lstStyle/>
+          <a:p>
+            <a:r>
+              <a:rPr lang="en-US" sz="4800" b="1" dirty="0" smtClean="0">
+                <a:solidFill>
+                  <a:srgbClr val="660033"/>
+                </a:solidFill>
+                <a:ea typeface="微軟正黑體" pitchFamily="34" charset="-120"/>
+              </a:rPr>
+              <a:t>5.</a:t>
+            </a:r>
+            <a:endParaRPr lang="vi-VN" sz="4800" b="1" dirty="0">
+              <a:solidFill>
+                <a:srgbClr val="660033"/>
+              </a:solidFill>
+              <a:ea typeface="微軟正黑體" pitchFamily="34" charset="-120"/>
+            </a:endParaRPr>
           </a:p>
         </p:txBody>
       </p:sp>

</xml_diff>